<commit_message>
add a schemematic for the structure of HDF5 database
</commit_message>
<xml_diff>
--- a/schematic.pptx
+++ b/schematic.pptx
@@ -8,6 +8,7 @@
     <p:sldId id="256" r:id="rId2"/>
     <p:sldId id="257" r:id="rId3"/>
     <p:sldId id="258" r:id="rId4"/>
+    <p:sldId id="259" r:id="rId5"/>
   </p:sldIdLst>
   <p:sldSz cx="12192000" cy="6858000"/>
   <p:notesSz cx="6858000" cy="9144000"/>
@@ -261,7 +262,7 @@
           <a:p>
             <a:fld id="{82FB5D42-861B-4AA5-94A2-66F0584F1558}" type="datetimeFigureOut">
               <a:rPr lang="zh-CN" altLang="en-US" smtClean="0"/>
-              <a:t>2024/12/5</a:t>
+              <a:t>2024/12/6</a:t>
             </a:fld>
             <a:endParaRPr lang="zh-CN" altLang="en-US"/>
           </a:p>
@@ -459,7 +460,7 @@
           <a:p>
             <a:fld id="{82FB5D42-861B-4AA5-94A2-66F0584F1558}" type="datetimeFigureOut">
               <a:rPr lang="zh-CN" altLang="en-US" smtClean="0"/>
-              <a:t>2024/12/5</a:t>
+              <a:t>2024/12/6</a:t>
             </a:fld>
             <a:endParaRPr lang="zh-CN" altLang="en-US"/>
           </a:p>
@@ -667,7 +668,7 @@
           <a:p>
             <a:fld id="{82FB5D42-861B-4AA5-94A2-66F0584F1558}" type="datetimeFigureOut">
               <a:rPr lang="zh-CN" altLang="en-US" smtClean="0"/>
-              <a:t>2024/12/5</a:t>
+              <a:t>2024/12/6</a:t>
             </a:fld>
             <a:endParaRPr lang="zh-CN" altLang="en-US"/>
           </a:p>
@@ -865,7 +866,7 @@
           <a:p>
             <a:fld id="{82FB5D42-861B-4AA5-94A2-66F0584F1558}" type="datetimeFigureOut">
               <a:rPr lang="zh-CN" altLang="en-US" smtClean="0"/>
-              <a:t>2024/12/5</a:t>
+              <a:t>2024/12/6</a:t>
             </a:fld>
             <a:endParaRPr lang="zh-CN" altLang="en-US"/>
           </a:p>
@@ -1140,7 +1141,7 @@
           <a:p>
             <a:fld id="{82FB5D42-861B-4AA5-94A2-66F0584F1558}" type="datetimeFigureOut">
               <a:rPr lang="zh-CN" altLang="en-US" smtClean="0"/>
-              <a:t>2024/12/5</a:t>
+              <a:t>2024/12/6</a:t>
             </a:fld>
             <a:endParaRPr lang="zh-CN" altLang="en-US"/>
           </a:p>
@@ -1405,7 +1406,7 @@
           <a:p>
             <a:fld id="{82FB5D42-861B-4AA5-94A2-66F0584F1558}" type="datetimeFigureOut">
               <a:rPr lang="zh-CN" altLang="en-US" smtClean="0"/>
-              <a:t>2024/12/5</a:t>
+              <a:t>2024/12/6</a:t>
             </a:fld>
             <a:endParaRPr lang="zh-CN" altLang="en-US"/>
           </a:p>
@@ -1817,7 +1818,7 @@
           <a:p>
             <a:fld id="{82FB5D42-861B-4AA5-94A2-66F0584F1558}" type="datetimeFigureOut">
               <a:rPr lang="zh-CN" altLang="en-US" smtClean="0"/>
-              <a:t>2024/12/5</a:t>
+              <a:t>2024/12/6</a:t>
             </a:fld>
             <a:endParaRPr lang="zh-CN" altLang="en-US"/>
           </a:p>
@@ -1958,7 +1959,7 @@
           <a:p>
             <a:fld id="{82FB5D42-861B-4AA5-94A2-66F0584F1558}" type="datetimeFigureOut">
               <a:rPr lang="zh-CN" altLang="en-US" smtClean="0"/>
-              <a:t>2024/12/5</a:t>
+              <a:t>2024/12/6</a:t>
             </a:fld>
             <a:endParaRPr lang="zh-CN" altLang="en-US"/>
           </a:p>
@@ -2071,7 +2072,7 @@
           <a:p>
             <a:fld id="{82FB5D42-861B-4AA5-94A2-66F0584F1558}" type="datetimeFigureOut">
               <a:rPr lang="zh-CN" altLang="en-US" smtClean="0"/>
-              <a:t>2024/12/5</a:t>
+              <a:t>2024/12/6</a:t>
             </a:fld>
             <a:endParaRPr lang="zh-CN" altLang="en-US"/>
           </a:p>
@@ -2382,7 +2383,7 @@
           <a:p>
             <a:fld id="{82FB5D42-861B-4AA5-94A2-66F0584F1558}" type="datetimeFigureOut">
               <a:rPr lang="zh-CN" altLang="en-US" smtClean="0"/>
-              <a:t>2024/12/5</a:t>
+              <a:t>2024/12/6</a:t>
             </a:fld>
             <a:endParaRPr lang="zh-CN" altLang="en-US"/>
           </a:p>
@@ -2670,7 +2671,7 @@
           <a:p>
             <a:fld id="{82FB5D42-861B-4AA5-94A2-66F0584F1558}" type="datetimeFigureOut">
               <a:rPr lang="zh-CN" altLang="en-US" smtClean="0"/>
-              <a:t>2024/12/5</a:t>
+              <a:t>2024/12/6</a:t>
             </a:fld>
             <a:endParaRPr lang="zh-CN" altLang="en-US"/>
           </a:p>
@@ -2911,7 +2912,7 @@
           <a:p>
             <a:fld id="{82FB5D42-861B-4AA5-94A2-66F0584F1558}" type="datetimeFigureOut">
               <a:rPr lang="zh-CN" altLang="en-US" smtClean="0"/>
-              <a:t>2024/12/5</a:t>
+              <a:t>2024/12/6</a:t>
             </a:fld>
             <a:endParaRPr lang="zh-CN" altLang="en-US"/>
           </a:p>
@@ -5802,6 +5803,827 @@
 </p:sld>
 </file>
 
+<file path=ppt/slides/slide4.xml><?xml version="1.0" encoding="utf-8"?>
+<p:sld xmlns:a="http://schemas.openxmlformats.org/drawingml/2006/main" xmlns:r="http://schemas.openxmlformats.org/officeDocument/2006/relationships" xmlns:p="http://schemas.openxmlformats.org/presentationml/2006/main">
+  <p:cSld>
+    <p:spTree>
+      <p:nvGrpSpPr>
+        <p:cNvPr id="1" name=""/>
+        <p:cNvGrpSpPr/>
+        <p:nvPr/>
+      </p:nvGrpSpPr>
+      <p:grpSpPr>
+        <a:xfrm>
+          <a:off x="0" y="0"/>
+          <a:ext cx="0" cy="0"/>
+          <a:chOff x="0" y="0"/>
+          <a:chExt cx="0" cy="0"/>
+        </a:xfrm>
+      </p:grpSpPr>
+      <p:sp>
+        <p:nvSpPr>
+          <p:cNvPr id="2" name="流程图: 多文档 1">
+            <a:extLst>
+              <a:ext uri="{FF2B5EF4-FFF2-40B4-BE49-F238E27FC236}">
+                <a16:creationId xmlns:a16="http://schemas.microsoft.com/office/drawing/2014/main" id="{DF4CD379-999C-57C4-FFE1-51A44D73EE40}"/>
+              </a:ext>
+            </a:extLst>
+          </p:cNvPr>
+          <p:cNvSpPr/>
+          <p:nvPr/>
+        </p:nvSpPr>
+        <p:spPr>
+          <a:xfrm>
+            <a:off x="5323803" y="1446861"/>
+            <a:ext cx="1544393" cy="941169"/>
+          </a:xfrm>
+          <a:prstGeom prst="flowChartMultidocument">
+            <a:avLst/>
+          </a:prstGeom>
+        </p:spPr>
+        <p:style>
+          <a:lnRef idx="2">
+            <a:schemeClr val="dk1"/>
+          </a:lnRef>
+          <a:fillRef idx="1">
+            <a:schemeClr val="lt1"/>
+          </a:fillRef>
+          <a:effectRef idx="0">
+            <a:schemeClr val="dk1"/>
+          </a:effectRef>
+          <a:fontRef idx="minor">
+            <a:schemeClr val="dk1"/>
+          </a:fontRef>
+        </p:style>
+        <p:txBody>
+          <a:bodyPr rtlCol="0" anchor="ctr"/>
+          <a:lstStyle/>
+          <a:p>
+            <a:pPr algn="ctr"/>
+            <a:r>
+              <a:rPr lang="en-US" altLang="zh-CN" dirty="0">
+                <a:latin typeface="Times New Roman" panose="02020603050405020304" pitchFamily="18" charset="0"/>
+                <a:cs typeface="Times New Roman" panose="02020603050405020304" pitchFamily="18" charset="0"/>
+              </a:rPr>
+              <a:t>HDF5</a:t>
+            </a:r>
+          </a:p>
+          <a:p>
+            <a:pPr algn="ctr"/>
+            <a:r>
+              <a:rPr lang="en-US" altLang="zh-CN" dirty="0">
+                <a:latin typeface="Times New Roman" panose="02020603050405020304" pitchFamily="18" charset="0"/>
+                <a:cs typeface="Times New Roman" panose="02020603050405020304" pitchFamily="18" charset="0"/>
+              </a:rPr>
+              <a:t>Matrix Data</a:t>
+            </a:r>
+            <a:endParaRPr lang="zh-CN" altLang="en-US" dirty="0">
+              <a:latin typeface="Times New Roman" panose="02020603050405020304" pitchFamily="18" charset="0"/>
+              <a:cs typeface="Times New Roman" panose="02020603050405020304" pitchFamily="18" charset="0"/>
+            </a:endParaRPr>
+          </a:p>
+        </p:txBody>
+      </p:sp>
+      <p:cxnSp>
+        <p:nvCxnSpPr>
+          <p:cNvPr id="4" name="直接连接符 3">
+            <a:extLst>
+              <a:ext uri="{FF2B5EF4-FFF2-40B4-BE49-F238E27FC236}">
+                <a16:creationId xmlns:a16="http://schemas.microsoft.com/office/drawing/2014/main" id="{5B16FD78-4F3C-237F-FF9C-0EB893439C3B}"/>
+              </a:ext>
+            </a:extLst>
+          </p:cNvPr>
+          <p:cNvCxnSpPr>
+            <a:cxnSpLocks/>
+          </p:cNvCxnSpPr>
+          <p:nvPr/>
+        </p:nvCxnSpPr>
+        <p:spPr>
+          <a:xfrm>
+            <a:off x="5323803" y="2415128"/>
+            <a:ext cx="1544393" cy="0"/>
+          </a:xfrm>
+          <a:prstGeom prst="line">
+            <a:avLst/>
+          </a:prstGeom>
+          <a:ln>
+            <a:solidFill>
+              <a:schemeClr val="bg1"/>
+            </a:solidFill>
+            <a:tailEnd type="triangle"/>
+          </a:ln>
+        </p:spPr>
+        <p:style>
+          <a:lnRef idx="1">
+            <a:schemeClr val="accent1"/>
+          </a:lnRef>
+          <a:fillRef idx="0">
+            <a:schemeClr val="accent1"/>
+          </a:fillRef>
+          <a:effectRef idx="0">
+            <a:schemeClr val="accent1"/>
+          </a:effectRef>
+          <a:fontRef idx="minor">
+            <a:schemeClr val="tx1"/>
+          </a:fontRef>
+        </p:style>
+      </p:cxnSp>
+      <p:sp>
+        <p:nvSpPr>
+          <p:cNvPr id="5" name="流程图: 决策 4">
+            <a:extLst>
+              <a:ext uri="{FF2B5EF4-FFF2-40B4-BE49-F238E27FC236}">
+                <a16:creationId xmlns:a16="http://schemas.microsoft.com/office/drawing/2014/main" id="{FD2AD398-8F39-746F-C095-155D290BCAC6}"/>
+              </a:ext>
+            </a:extLst>
+          </p:cNvPr>
+          <p:cNvSpPr/>
+          <p:nvPr/>
+        </p:nvSpPr>
+        <p:spPr>
+          <a:xfrm>
+            <a:off x="5961458" y="2369344"/>
+            <a:ext cx="269081" cy="90486"/>
+          </a:xfrm>
+          <a:prstGeom prst="flowChartDecision">
+            <a:avLst/>
+          </a:prstGeom>
+          <a:noFill/>
+          <a:ln>
+            <a:noFill/>
+          </a:ln>
+        </p:spPr>
+        <p:style>
+          <a:lnRef idx="2">
+            <a:schemeClr val="accent1">
+              <a:shade val="15000"/>
+            </a:schemeClr>
+          </a:lnRef>
+          <a:fillRef idx="1">
+            <a:schemeClr val="accent1"/>
+          </a:fillRef>
+          <a:effectRef idx="0">
+            <a:schemeClr val="accent1"/>
+          </a:effectRef>
+          <a:fontRef idx="minor">
+            <a:schemeClr val="lt1"/>
+          </a:fontRef>
+        </p:style>
+        <p:txBody>
+          <a:bodyPr rtlCol="0" anchor="ctr"/>
+          <a:lstStyle/>
+          <a:p>
+            <a:pPr algn="ctr"/>
+            <a:endParaRPr lang="zh-CN" altLang="en-US"/>
+          </a:p>
+        </p:txBody>
+      </p:sp>
+      <p:sp>
+        <p:nvSpPr>
+          <p:cNvPr id="7" name="矩形 6">
+            <a:extLst>
+              <a:ext uri="{FF2B5EF4-FFF2-40B4-BE49-F238E27FC236}">
+                <a16:creationId xmlns:a16="http://schemas.microsoft.com/office/drawing/2014/main" id="{1EC4C04A-FACB-F5C8-03BD-1BD2DA3204F5}"/>
+              </a:ext>
+            </a:extLst>
+          </p:cNvPr>
+          <p:cNvSpPr/>
+          <p:nvPr/>
+        </p:nvSpPr>
+        <p:spPr>
+          <a:xfrm>
+            <a:off x="3785235" y="2864485"/>
+            <a:ext cx="965200" cy="225425"/>
+          </a:xfrm>
+          <a:prstGeom prst="rect">
+            <a:avLst/>
+          </a:prstGeom>
+          <a:ln w="6350">
+            <a:noFill/>
+          </a:ln>
+        </p:spPr>
+        <p:style>
+          <a:lnRef idx="2">
+            <a:schemeClr val="accent6"/>
+          </a:lnRef>
+          <a:fillRef idx="1">
+            <a:schemeClr val="lt1"/>
+          </a:fillRef>
+          <a:effectRef idx="0">
+            <a:schemeClr val="accent6"/>
+          </a:effectRef>
+          <a:fontRef idx="minor">
+            <a:schemeClr val="dk1"/>
+          </a:fontRef>
+        </p:style>
+        <p:txBody>
+          <a:bodyPr lIns="0" tIns="0" rIns="0" bIns="0" rtlCol="0" anchor="ctr"/>
+          <a:lstStyle/>
+          <a:p>
+            <a:pPr algn="ctr"/>
+            <a:r>
+              <a:rPr lang="en-US" altLang="zh-CN" dirty="0">
+                <a:latin typeface="Times New Roman" panose="02020603050405020304" pitchFamily="18" charset="0"/>
+                <a:ea typeface="宋体" panose="02010600030101010101" pitchFamily="2" charset="-122"/>
+              </a:rPr>
+              <a:t>Field Data</a:t>
+            </a:r>
+            <a:endParaRPr lang="zh-CN" altLang="en-US" dirty="0">
+              <a:latin typeface="Times New Roman" panose="02020603050405020304" pitchFamily="18" charset="0"/>
+              <a:ea typeface="宋体" panose="02010600030101010101" pitchFamily="2" charset="-122"/>
+            </a:endParaRPr>
+          </a:p>
+        </p:txBody>
+      </p:sp>
+      <p:sp>
+        <p:nvSpPr>
+          <p:cNvPr id="8" name="矩形 7">
+            <a:extLst>
+              <a:ext uri="{FF2B5EF4-FFF2-40B4-BE49-F238E27FC236}">
+                <a16:creationId xmlns:a16="http://schemas.microsoft.com/office/drawing/2014/main" id="{5FD3EACE-1132-9C80-2907-D07DFAE454C6}"/>
+              </a:ext>
+            </a:extLst>
+          </p:cNvPr>
+          <p:cNvSpPr/>
+          <p:nvPr/>
+        </p:nvSpPr>
+        <p:spPr>
+          <a:xfrm>
+            <a:off x="2597785" y="2864484"/>
+            <a:ext cx="1133475" cy="225425"/>
+          </a:xfrm>
+          <a:prstGeom prst="rect">
+            <a:avLst/>
+          </a:prstGeom>
+          <a:ln w="6350">
+            <a:noFill/>
+          </a:ln>
+        </p:spPr>
+        <p:style>
+          <a:lnRef idx="2">
+            <a:schemeClr val="accent6"/>
+          </a:lnRef>
+          <a:fillRef idx="1">
+            <a:schemeClr val="lt1"/>
+          </a:fillRef>
+          <a:effectRef idx="0">
+            <a:schemeClr val="accent6"/>
+          </a:effectRef>
+          <a:fontRef idx="minor">
+            <a:schemeClr val="dk1"/>
+          </a:fontRef>
+        </p:style>
+        <p:txBody>
+          <a:bodyPr lIns="0" tIns="0" rIns="0" bIns="0" rtlCol="0" anchor="ctr"/>
+          <a:lstStyle/>
+          <a:p>
+            <a:pPr algn="ctr"/>
+            <a:r>
+              <a:rPr lang="en-US" altLang="zh-CN" dirty="0" err="1">
+                <a:latin typeface="Times New Roman" panose="02020603050405020304" pitchFamily="18" charset="0"/>
+                <a:ea typeface="宋体" panose="02010600030101010101" pitchFamily="2" charset="-122"/>
+              </a:rPr>
+              <a:t>InParameter</a:t>
+            </a:r>
+            <a:endParaRPr lang="zh-CN" altLang="en-US" dirty="0">
+              <a:latin typeface="Times New Roman" panose="02020603050405020304" pitchFamily="18" charset="0"/>
+              <a:ea typeface="宋体" panose="02010600030101010101" pitchFamily="2" charset="-122"/>
+            </a:endParaRPr>
+          </a:p>
+        </p:txBody>
+      </p:sp>
+      <p:sp>
+        <p:nvSpPr>
+          <p:cNvPr id="9" name="矩形: 圆角 8">
+            <a:extLst>
+              <a:ext uri="{FF2B5EF4-FFF2-40B4-BE49-F238E27FC236}">
+                <a16:creationId xmlns:a16="http://schemas.microsoft.com/office/drawing/2014/main" id="{4603AE53-B866-9496-4E44-43B14570A1DE}"/>
+              </a:ext>
+            </a:extLst>
+          </p:cNvPr>
+          <p:cNvSpPr/>
+          <p:nvPr/>
+        </p:nvSpPr>
+        <p:spPr>
+          <a:xfrm>
+            <a:off x="2522220" y="2780887"/>
+            <a:ext cx="2308860" cy="404273"/>
+          </a:xfrm>
+          <a:prstGeom prst="roundRect">
+            <a:avLst>
+              <a:gd name="adj" fmla="val 34297"/>
+            </a:avLst>
+          </a:prstGeom>
+          <a:noFill/>
+          <a:ln>
+            <a:prstDash val="dash"/>
+          </a:ln>
+        </p:spPr>
+        <p:style>
+          <a:lnRef idx="2">
+            <a:schemeClr val="dk1"/>
+          </a:lnRef>
+          <a:fillRef idx="1">
+            <a:schemeClr val="lt1"/>
+          </a:fillRef>
+          <a:effectRef idx="0">
+            <a:schemeClr val="dk1"/>
+          </a:effectRef>
+          <a:fontRef idx="minor">
+            <a:schemeClr val="dk1"/>
+          </a:fontRef>
+        </p:style>
+        <p:txBody>
+          <a:bodyPr rtlCol="0" anchor="ctr"/>
+          <a:lstStyle/>
+          <a:p>
+            <a:pPr algn="ctr"/>
+            <a:endParaRPr lang="zh-CN" altLang="en-US" dirty="0">
+              <a:latin typeface="Times New Roman" panose="02020603050405020304" pitchFamily="18" charset="0"/>
+              <a:ea typeface="宋体" panose="02010600030101010101" pitchFamily="2" charset="-122"/>
+            </a:endParaRPr>
+          </a:p>
+        </p:txBody>
+      </p:sp>
+      <p:sp>
+        <p:nvSpPr>
+          <p:cNvPr id="10" name="矩形 9">
+            <a:extLst>
+              <a:ext uri="{FF2B5EF4-FFF2-40B4-BE49-F238E27FC236}">
+                <a16:creationId xmlns:a16="http://schemas.microsoft.com/office/drawing/2014/main" id="{31753ABC-1300-2A4E-8AFB-044B7066EAF2}"/>
+              </a:ext>
+            </a:extLst>
+          </p:cNvPr>
+          <p:cNvSpPr/>
+          <p:nvPr/>
+        </p:nvSpPr>
+        <p:spPr>
+          <a:xfrm>
+            <a:off x="6202680" y="2864485"/>
+            <a:ext cx="965200" cy="225425"/>
+          </a:xfrm>
+          <a:prstGeom prst="rect">
+            <a:avLst/>
+          </a:prstGeom>
+          <a:ln w="6350">
+            <a:noFill/>
+          </a:ln>
+        </p:spPr>
+        <p:style>
+          <a:lnRef idx="2">
+            <a:schemeClr val="accent6"/>
+          </a:lnRef>
+          <a:fillRef idx="1">
+            <a:schemeClr val="lt1"/>
+          </a:fillRef>
+          <a:effectRef idx="0">
+            <a:schemeClr val="accent6"/>
+          </a:effectRef>
+          <a:fontRef idx="minor">
+            <a:schemeClr val="dk1"/>
+          </a:fontRef>
+        </p:style>
+        <p:txBody>
+          <a:bodyPr lIns="0" tIns="0" rIns="0" bIns="0" rtlCol="0" anchor="ctr"/>
+          <a:lstStyle/>
+          <a:p>
+            <a:pPr algn="ctr"/>
+            <a:r>
+              <a:rPr lang="en-US" altLang="zh-CN" dirty="0">
+                <a:latin typeface="Times New Roman" panose="02020603050405020304" pitchFamily="18" charset="0"/>
+                <a:ea typeface="宋体" panose="02010600030101010101" pitchFamily="2" charset="-122"/>
+              </a:rPr>
+              <a:t>Field Data</a:t>
+            </a:r>
+            <a:endParaRPr lang="zh-CN" altLang="en-US" dirty="0">
+              <a:latin typeface="Times New Roman" panose="02020603050405020304" pitchFamily="18" charset="0"/>
+              <a:ea typeface="宋体" panose="02010600030101010101" pitchFamily="2" charset="-122"/>
+            </a:endParaRPr>
+          </a:p>
+        </p:txBody>
+      </p:sp>
+      <p:sp>
+        <p:nvSpPr>
+          <p:cNvPr id="11" name="矩形 10">
+            <a:extLst>
+              <a:ext uri="{FF2B5EF4-FFF2-40B4-BE49-F238E27FC236}">
+                <a16:creationId xmlns:a16="http://schemas.microsoft.com/office/drawing/2014/main" id="{DC62A1B0-BC66-F86A-4257-7CB47D39065F}"/>
+              </a:ext>
+            </a:extLst>
+          </p:cNvPr>
+          <p:cNvSpPr/>
+          <p:nvPr/>
+        </p:nvSpPr>
+        <p:spPr>
+          <a:xfrm>
+            <a:off x="5015230" y="2864484"/>
+            <a:ext cx="1133475" cy="225425"/>
+          </a:xfrm>
+          <a:prstGeom prst="rect">
+            <a:avLst/>
+          </a:prstGeom>
+          <a:ln w="6350">
+            <a:noFill/>
+          </a:ln>
+        </p:spPr>
+        <p:style>
+          <a:lnRef idx="2">
+            <a:schemeClr val="accent6"/>
+          </a:lnRef>
+          <a:fillRef idx="1">
+            <a:schemeClr val="lt1"/>
+          </a:fillRef>
+          <a:effectRef idx="0">
+            <a:schemeClr val="accent6"/>
+          </a:effectRef>
+          <a:fontRef idx="minor">
+            <a:schemeClr val="dk1"/>
+          </a:fontRef>
+        </p:style>
+        <p:txBody>
+          <a:bodyPr lIns="0" tIns="0" rIns="0" bIns="0" rtlCol="0" anchor="ctr"/>
+          <a:lstStyle/>
+          <a:p>
+            <a:pPr algn="ctr"/>
+            <a:r>
+              <a:rPr lang="en-US" altLang="zh-CN" dirty="0" err="1">
+                <a:latin typeface="Times New Roman" panose="02020603050405020304" pitchFamily="18" charset="0"/>
+                <a:ea typeface="宋体" panose="02010600030101010101" pitchFamily="2" charset="-122"/>
+              </a:rPr>
+              <a:t>InParameter</a:t>
+            </a:r>
+            <a:endParaRPr lang="zh-CN" altLang="en-US" dirty="0">
+              <a:latin typeface="Times New Roman" panose="02020603050405020304" pitchFamily="18" charset="0"/>
+              <a:ea typeface="宋体" panose="02010600030101010101" pitchFamily="2" charset="-122"/>
+            </a:endParaRPr>
+          </a:p>
+        </p:txBody>
+      </p:sp>
+      <p:sp>
+        <p:nvSpPr>
+          <p:cNvPr id="12" name="矩形: 圆角 11">
+            <a:extLst>
+              <a:ext uri="{FF2B5EF4-FFF2-40B4-BE49-F238E27FC236}">
+                <a16:creationId xmlns:a16="http://schemas.microsoft.com/office/drawing/2014/main" id="{3EC663D3-680E-F807-D2D0-B9367E149244}"/>
+              </a:ext>
+            </a:extLst>
+          </p:cNvPr>
+          <p:cNvSpPr/>
+          <p:nvPr/>
+        </p:nvSpPr>
+        <p:spPr>
+          <a:xfrm>
+            <a:off x="4939665" y="2780887"/>
+            <a:ext cx="2308860" cy="404273"/>
+          </a:xfrm>
+          <a:prstGeom prst="roundRect">
+            <a:avLst>
+              <a:gd name="adj" fmla="val 34297"/>
+            </a:avLst>
+          </a:prstGeom>
+          <a:noFill/>
+          <a:ln>
+            <a:prstDash val="dash"/>
+          </a:ln>
+        </p:spPr>
+        <p:style>
+          <a:lnRef idx="2">
+            <a:schemeClr val="dk1"/>
+          </a:lnRef>
+          <a:fillRef idx="1">
+            <a:schemeClr val="lt1"/>
+          </a:fillRef>
+          <a:effectRef idx="0">
+            <a:schemeClr val="dk1"/>
+          </a:effectRef>
+          <a:fontRef idx="minor">
+            <a:schemeClr val="dk1"/>
+          </a:fontRef>
+        </p:style>
+        <p:txBody>
+          <a:bodyPr rtlCol="0" anchor="ctr"/>
+          <a:lstStyle/>
+          <a:p>
+            <a:pPr algn="ctr"/>
+            <a:endParaRPr lang="zh-CN" altLang="en-US" dirty="0">
+              <a:latin typeface="Times New Roman" panose="02020603050405020304" pitchFamily="18" charset="0"/>
+              <a:ea typeface="宋体" panose="02010600030101010101" pitchFamily="2" charset="-122"/>
+            </a:endParaRPr>
+          </a:p>
+        </p:txBody>
+      </p:sp>
+      <p:sp>
+        <p:nvSpPr>
+          <p:cNvPr id="13" name="矩形: 圆角 12">
+            <a:extLst>
+              <a:ext uri="{FF2B5EF4-FFF2-40B4-BE49-F238E27FC236}">
+                <a16:creationId xmlns:a16="http://schemas.microsoft.com/office/drawing/2014/main" id="{2A1AAA16-418C-973C-5F81-A1730CF713B6}"/>
+              </a:ext>
+            </a:extLst>
+          </p:cNvPr>
+          <p:cNvSpPr/>
+          <p:nvPr/>
+        </p:nvSpPr>
+        <p:spPr>
+          <a:xfrm>
+            <a:off x="7492365" y="2774965"/>
+            <a:ext cx="2308860" cy="404273"/>
+          </a:xfrm>
+          <a:prstGeom prst="roundRect">
+            <a:avLst>
+              <a:gd name="adj" fmla="val 34297"/>
+            </a:avLst>
+          </a:prstGeom>
+          <a:noFill/>
+          <a:ln>
+            <a:prstDash val="dash"/>
+          </a:ln>
+        </p:spPr>
+        <p:style>
+          <a:lnRef idx="2">
+            <a:schemeClr val="dk1"/>
+          </a:lnRef>
+          <a:fillRef idx="1">
+            <a:schemeClr val="lt1"/>
+          </a:fillRef>
+          <a:effectRef idx="0">
+            <a:schemeClr val="dk1"/>
+          </a:effectRef>
+          <a:fontRef idx="minor">
+            <a:schemeClr val="dk1"/>
+          </a:fontRef>
+        </p:style>
+        <p:txBody>
+          <a:bodyPr lIns="0" tIns="0" rIns="0" bIns="0" rtlCol="0" anchor="ctr"/>
+          <a:lstStyle/>
+          <a:p>
+            <a:pPr algn="ctr"/>
+            <a:r>
+              <a:rPr lang="en-US" altLang="zh-CN" dirty="0">
+                <a:latin typeface="Times New Roman" panose="02020603050405020304" pitchFamily="18" charset="0"/>
+                <a:ea typeface="宋体" panose="02010600030101010101" pitchFamily="2" charset="-122"/>
+              </a:rPr>
+              <a:t>...</a:t>
+            </a:r>
+            <a:endParaRPr lang="zh-CN" altLang="en-US" dirty="0">
+              <a:latin typeface="Times New Roman" panose="02020603050405020304" pitchFamily="18" charset="0"/>
+              <a:ea typeface="宋体" panose="02010600030101010101" pitchFamily="2" charset="-122"/>
+            </a:endParaRPr>
+          </a:p>
+        </p:txBody>
+      </p:sp>
+      <p:cxnSp>
+        <p:nvCxnSpPr>
+          <p:cNvPr id="15" name="连接符: 肘形 14">
+            <a:extLst>
+              <a:ext uri="{FF2B5EF4-FFF2-40B4-BE49-F238E27FC236}">
+                <a16:creationId xmlns:a16="http://schemas.microsoft.com/office/drawing/2014/main" id="{58D1F58F-8794-B679-B5E4-1D5ED934B09A}"/>
+              </a:ext>
+            </a:extLst>
+          </p:cNvPr>
+          <p:cNvCxnSpPr>
+            <a:stCxn id="5" idx="2"/>
+            <a:endCxn id="9" idx="0"/>
+          </p:cNvCxnSpPr>
+          <p:nvPr/>
+        </p:nvCxnSpPr>
+        <p:spPr>
+          <a:xfrm rot="5400000">
+            <a:off x="4725797" y="1410684"/>
+            <a:ext cx="321057" cy="2419349"/>
+          </a:xfrm>
+          <a:prstGeom prst="bentConnector3">
+            <a:avLst/>
+          </a:prstGeom>
+          <a:ln>
+            <a:solidFill>
+              <a:schemeClr val="tx1"/>
+            </a:solidFill>
+            <a:tailEnd type="triangle"/>
+          </a:ln>
+        </p:spPr>
+        <p:style>
+          <a:lnRef idx="1">
+            <a:schemeClr val="accent1"/>
+          </a:lnRef>
+          <a:fillRef idx="0">
+            <a:schemeClr val="accent1"/>
+          </a:fillRef>
+          <a:effectRef idx="0">
+            <a:schemeClr val="accent1"/>
+          </a:effectRef>
+          <a:fontRef idx="minor">
+            <a:schemeClr val="tx1"/>
+          </a:fontRef>
+        </p:style>
+      </p:cxnSp>
+      <p:cxnSp>
+        <p:nvCxnSpPr>
+          <p:cNvPr id="19" name="连接符: 肘形 18">
+            <a:extLst>
+              <a:ext uri="{FF2B5EF4-FFF2-40B4-BE49-F238E27FC236}">
+                <a16:creationId xmlns:a16="http://schemas.microsoft.com/office/drawing/2014/main" id="{6579CB9B-4ACE-C285-9C59-EFDA90A50CD0}"/>
+              </a:ext>
+            </a:extLst>
+          </p:cNvPr>
+          <p:cNvCxnSpPr>
+            <a:stCxn id="5" idx="2"/>
+            <a:endCxn id="13" idx="0"/>
+          </p:cNvCxnSpPr>
+          <p:nvPr/>
+        </p:nvCxnSpPr>
+        <p:spPr>
+          <a:xfrm rot="16200000" flipH="1">
+            <a:off x="7213830" y="1341999"/>
+            <a:ext cx="315135" cy="2550796"/>
+          </a:xfrm>
+          <a:prstGeom prst="bentConnector3">
+            <a:avLst/>
+          </a:prstGeom>
+          <a:ln>
+            <a:solidFill>
+              <a:schemeClr val="tx1"/>
+            </a:solidFill>
+            <a:tailEnd type="triangle"/>
+          </a:ln>
+        </p:spPr>
+        <p:style>
+          <a:lnRef idx="1">
+            <a:schemeClr val="accent1"/>
+          </a:lnRef>
+          <a:fillRef idx="0">
+            <a:schemeClr val="accent1"/>
+          </a:fillRef>
+          <a:effectRef idx="0">
+            <a:schemeClr val="accent1"/>
+          </a:effectRef>
+          <a:fontRef idx="minor">
+            <a:schemeClr val="tx1"/>
+          </a:fontRef>
+        </p:style>
+      </p:cxnSp>
+      <p:sp>
+        <p:nvSpPr>
+          <p:cNvPr id="20" name="矩形 19">
+            <a:extLst>
+              <a:ext uri="{FF2B5EF4-FFF2-40B4-BE49-F238E27FC236}">
+                <a16:creationId xmlns:a16="http://schemas.microsoft.com/office/drawing/2014/main" id="{8EA19E1B-5844-3B55-D97B-E505513DFD6A}"/>
+              </a:ext>
+            </a:extLst>
+          </p:cNvPr>
+          <p:cNvSpPr/>
+          <p:nvPr/>
+        </p:nvSpPr>
+        <p:spPr>
+          <a:xfrm>
+            <a:off x="3730943" y="3447416"/>
+            <a:ext cx="1073784" cy="225425"/>
+          </a:xfrm>
+          <a:prstGeom prst="rect">
+            <a:avLst/>
+          </a:prstGeom>
+          <a:ln w="6350">
+            <a:solidFill>
+              <a:schemeClr val="tx1"/>
+            </a:solidFill>
+          </a:ln>
+        </p:spPr>
+        <p:style>
+          <a:lnRef idx="2">
+            <a:schemeClr val="accent6"/>
+          </a:lnRef>
+          <a:fillRef idx="1">
+            <a:schemeClr val="lt1"/>
+          </a:fillRef>
+          <a:effectRef idx="0">
+            <a:schemeClr val="accent6"/>
+          </a:effectRef>
+          <a:fontRef idx="minor">
+            <a:schemeClr val="dk1"/>
+          </a:fontRef>
+        </p:style>
+        <p:txBody>
+          <a:bodyPr lIns="0" tIns="0" rIns="0" bIns="0" rtlCol="0" anchor="ctr"/>
+          <a:lstStyle/>
+          <a:p>
+            <a:pPr algn="ctr"/>
+            <a:r>
+              <a:rPr lang="en-US" altLang="zh-CN" dirty="0">
+                <a:latin typeface="Times New Roman" panose="02020603050405020304" pitchFamily="18" charset="0"/>
+                <a:ea typeface="宋体" panose="02010600030101010101" pitchFamily="2" charset="-122"/>
+              </a:rPr>
+              <a:t>Block Data</a:t>
+            </a:r>
+            <a:endParaRPr lang="zh-CN" altLang="en-US" dirty="0">
+              <a:latin typeface="Times New Roman" panose="02020603050405020304" pitchFamily="18" charset="0"/>
+              <a:ea typeface="宋体" panose="02010600030101010101" pitchFamily="2" charset="-122"/>
+            </a:endParaRPr>
+          </a:p>
+        </p:txBody>
+      </p:sp>
+      <p:cxnSp>
+        <p:nvCxnSpPr>
+          <p:cNvPr id="24" name="直接箭头连接符 23">
+            <a:extLst>
+              <a:ext uri="{FF2B5EF4-FFF2-40B4-BE49-F238E27FC236}">
+                <a16:creationId xmlns:a16="http://schemas.microsoft.com/office/drawing/2014/main" id="{91840CF5-558D-C3D8-67DC-2D80DB1A5F95}"/>
+              </a:ext>
+            </a:extLst>
+          </p:cNvPr>
+          <p:cNvCxnSpPr>
+            <a:stCxn id="7" idx="2"/>
+            <a:endCxn id="20" idx="0"/>
+          </p:cNvCxnSpPr>
+          <p:nvPr/>
+        </p:nvCxnSpPr>
+        <p:spPr>
+          <a:xfrm>
+            <a:off x="4267835" y="3089910"/>
+            <a:ext cx="0" cy="357506"/>
+          </a:xfrm>
+          <a:prstGeom prst="straightConnector1">
+            <a:avLst/>
+          </a:prstGeom>
+          <a:ln>
+            <a:solidFill>
+              <a:schemeClr val="tx1"/>
+            </a:solidFill>
+            <a:tailEnd type="triangle"/>
+          </a:ln>
+        </p:spPr>
+        <p:style>
+          <a:lnRef idx="1">
+            <a:schemeClr val="accent1"/>
+          </a:lnRef>
+          <a:fillRef idx="0">
+            <a:schemeClr val="accent1"/>
+          </a:fillRef>
+          <a:effectRef idx="0">
+            <a:schemeClr val="accent1"/>
+          </a:effectRef>
+          <a:fontRef idx="minor">
+            <a:schemeClr val="tx1"/>
+          </a:fontRef>
+        </p:style>
+      </p:cxnSp>
+      <p:cxnSp>
+        <p:nvCxnSpPr>
+          <p:cNvPr id="26" name="直接箭头连接符 25">
+            <a:extLst>
+              <a:ext uri="{FF2B5EF4-FFF2-40B4-BE49-F238E27FC236}">
+                <a16:creationId xmlns:a16="http://schemas.microsoft.com/office/drawing/2014/main" id="{E5D334F7-81B7-3378-B4E1-02622E2E0905}"/>
+              </a:ext>
+            </a:extLst>
+          </p:cNvPr>
+          <p:cNvCxnSpPr>
+            <a:stCxn id="5" idx="2"/>
+            <a:endCxn id="12" idx="0"/>
+          </p:cNvCxnSpPr>
+          <p:nvPr/>
+        </p:nvCxnSpPr>
+        <p:spPr>
+          <a:xfrm flipH="1">
+            <a:off x="6094095" y="2459830"/>
+            <a:ext cx="1904" cy="321057"/>
+          </a:xfrm>
+          <a:prstGeom prst="straightConnector1">
+            <a:avLst/>
+          </a:prstGeom>
+          <a:ln>
+            <a:solidFill>
+              <a:schemeClr val="tx1"/>
+            </a:solidFill>
+            <a:tailEnd type="triangle"/>
+          </a:ln>
+        </p:spPr>
+        <p:style>
+          <a:lnRef idx="1">
+            <a:schemeClr val="accent1"/>
+          </a:lnRef>
+          <a:fillRef idx="0">
+            <a:schemeClr val="accent1"/>
+          </a:fillRef>
+          <a:effectRef idx="0">
+            <a:schemeClr val="accent1"/>
+          </a:effectRef>
+          <a:fontRef idx="minor">
+            <a:schemeClr val="tx1"/>
+          </a:fontRef>
+        </p:style>
+      </p:cxnSp>
+    </p:spTree>
+    <p:extLst>
+      <p:ext uri="{BB962C8B-B14F-4D97-AF65-F5344CB8AC3E}">
+        <p14:creationId xmlns:p14="http://schemas.microsoft.com/office/powerpoint/2010/main" val="2110043737"/>
+      </p:ext>
+    </p:extLst>
+  </p:cSld>
+  <p:clrMapOvr>
+    <a:masterClrMapping/>
+  </p:clrMapOvr>
+</p:sld>
+</file>
+
 <file path=ppt/theme/theme1.xml><?xml version="1.0" encoding="utf-8"?>
 <a:theme xmlns:a="http://schemas.openxmlformats.org/drawingml/2006/main" name="Office 主题​​">
   <a:themeElements>

</xml_diff>